<commit_message>
Proceso de Aseguramiento de la Calidad
</commit_message>
<xml_diff>
--- a/Area_de_Proceso-_PPQA/PQA/PQA_V1.1_2015.pptx
+++ b/Area_de_Proceso-_PPQA/PQA/PQA_V1.1_2015.pptx
@@ -3745,7 +3745,7 @@
           <a:p>
             <a:fld id="{56F99C03-A70A-4B29-84B2-81DDC41A991A}" type="datetimeFigureOut">
               <a:rPr lang="es-PE" smtClean="0"/>
-              <a:t>16/11/2015</a:t>
+              <a:t>19/11/2015</a:t>
             </a:fld>
             <a:endParaRPr lang="es-PE" dirty="0"/>
           </a:p>
@@ -5465,7 +5465,7 @@
           <a:p>
             <a:fld id="{216C5678-EE20-4FA5-88E2-6E0BD67A2E26}" type="datetime1">
               <a:rPr lang="en-US" smtClean="0"/>
-              <a:t>11/16/2015</a:t>
+              <a:t>11/19/2015</a:t>
             </a:fld>
             <a:endParaRPr lang="en-US" dirty="0"/>
           </a:p>
@@ -5635,7 +5635,7 @@
           <a:p>
             <a:fld id="{EA051B39-B140-43FE-96DB-472A2B59CE7C}" type="datetime1">
               <a:rPr lang="en-US" smtClean="0"/>
-              <a:t>11/16/2015</a:t>
+              <a:t>11/19/2015</a:t>
             </a:fld>
             <a:endParaRPr lang="en-US" dirty="0"/>
           </a:p>
@@ -5815,7 +5815,7 @@
           <a:p>
             <a:fld id="{DA600BB2-27C5-458B-ABCE-839C88CF47CE}" type="datetime1">
               <a:rPr lang="en-US" smtClean="0"/>
-              <a:t>11/16/2015</a:t>
+              <a:t>11/19/2015</a:t>
             </a:fld>
             <a:endParaRPr lang="en-US" dirty="0"/>
           </a:p>
@@ -6003,7 +6003,7 @@
           <a:p>
             <a:fld id="{B11D738E-8962-435F-8C43-147B8DD7E819}" type="datetime1">
               <a:rPr lang="en-US" smtClean="0"/>
-              <a:t>11/16/2015</a:t>
+              <a:t>11/19/2015</a:t>
             </a:fld>
             <a:endParaRPr lang="en-US" dirty="0"/>
           </a:p>
@@ -6270,7 +6270,7 @@
           <a:p>
             <a:fld id="{09CAEA93-55E7-4DA9-90C2-089A26EEFEC4}" type="datetime1">
               <a:rPr lang="en-US" smtClean="0"/>
-              <a:t>11/16/2015</a:t>
+              <a:t>11/19/2015</a:t>
             </a:fld>
             <a:endParaRPr lang="en-US" dirty="0"/>
           </a:p>
@@ -6623,7 +6623,7 @@
           <a:p>
             <a:fld id="{E34CF3C7-6809-4F39-BD67-A75817BDDE0A}" type="datetime1">
               <a:rPr lang="en-US" smtClean="0"/>
-              <a:t>11/16/2015</a:t>
+              <a:t>11/19/2015</a:t>
             </a:fld>
             <a:endParaRPr lang="en-US" dirty="0"/>
           </a:p>
@@ -6936,7 +6936,7 @@
           <a:p>
             <a:fld id="{F7EAEB24-CE78-465C-A726-91D0868FA48F}" type="datetime1">
               <a:rPr lang="en-US" smtClean="0"/>
-              <a:t>11/16/2015</a:t>
+              <a:t>11/19/2015</a:t>
             </a:fld>
             <a:endParaRPr lang="en-US" dirty="0"/>
           </a:p>
@@ -7168,7 +7168,7 @@
           <a:p>
             <a:fld id="{40BAADF0-1749-4E8B-9691-B44A5F8C0895}" type="datetime1">
               <a:rPr lang="en-US" smtClean="0"/>
-              <a:t>11/16/2015</a:t>
+              <a:t>11/19/2015</a:t>
             </a:fld>
             <a:endParaRPr lang="en-US" dirty="0"/>
           </a:p>
@@ -7263,7 +7263,7 @@
           <a:p>
             <a:fld id="{A8AF628A-A867-4937-BBE5-207DB6F9C51A}" type="datetime1">
               <a:rPr lang="en-US" smtClean="0"/>
-              <a:t>11/16/2015</a:t>
+              <a:t>11/19/2015</a:t>
             </a:fld>
             <a:endParaRPr lang="en-US" dirty="0"/>
           </a:p>
@@ -7556,7 +7556,7 @@
           <a:p>
             <a:fld id="{118BBB94-68E6-4675-A946-F1C5994EDBD7}" type="datetime1">
               <a:rPr lang="en-US" smtClean="0"/>
-              <a:t>11/16/2015</a:t>
+              <a:t>11/19/2015</a:t>
             </a:fld>
             <a:endParaRPr lang="en-US" dirty="0"/>
           </a:p>
@@ -7830,7 +7830,7 @@
           <a:p>
             <a:fld id="{DC3B8377-21E3-4835-B75D-4E2847E2750F}" type="datetime1">
               <a:rPr lang="en-US" smtClean="0"/>
-              <a:t>11/16/2015</a:t>
+              <a:t>11/19/2015</a:t>
             </a:fld>
             <a:endParaRPr lang="en-US" dirty="0"/>
           </a:p>
@@ -8045,7 +8045,7 @@
           <a:p>
             <a:fld id="{B0C4986D-6BE9-4264-908F-02DB36FD8D6C}" type="datetime1">
               <a:rPr lang="en-US" smtClean="0"/>
-              <a:t>11/16/2015</a:t>
+              <a:t>11/19/2015</a:t>
             </a:fld>
             <a:endParaRPr lang="en-US" dirty="0"/>
           </a:p>
@@ -8586,7 +8586,7 @@
           <a:p>
             <a:fld id="{216C5678-EE20-4FA5-88E2-6E0BD67A2E26}" type="datetime1">
               <a:rPr lang="en-US" smtClean="0"/>
-              <a:t>11/16/2015</a:t>
+              <a:t>11/19/2015</a:t>
             </a:fld>
             <a:endParaRPr lang="en-US" dirty="0"/>
           </a:p>
@@ -9096,7 +9096,7 @@
           <a:p>
             <a:fld id="{216C5678-EE20-4FA5-88E2-6E0BD67A2E26}" type="datetime1">
               <a:rPr lang="en-US" smtClean="0"/>
-              <a:t>11/16/2015</a:t>
+              <a:t>11/19/2015</a:t>
             </a:fld>
             <a:endParaRPr lang="en-US" dirty="0"/>
           </a:p>
@@ -9610,7 +9610,7 @@
           <a:p>
             <a:fld id="{216C5678-EE20-4FA5-88E2-6E0BD67A2E26}" type="datetime1">
               <a:rPr lang="en-US" smtClean="0"/>
-              <a:t>11/16/2015</a:t>
+              <a:t>11/19/2015</a:t>
             </a:fld>
             <a:endParaRPr lang="en-US" dirty="0"/>
           </a:p>
@@ -9773,7 +9773,7 @@
           <a:p>
             <a:fld id="{216C5678-EE20-4FA5-88E2-6E0BD67A2E26}" type="datetime1">
               <a:rPr lang="en-US" smtClean="0"/>
-              <a:t>11/16/2015</a:t>
+              <a:t>11/19/2015</a:t>
             </a:fld>
             <a:endParaRPr lang="en-US" dirty="0"/>
           </a:p>
@@ -10025,7 +10025,7 @@
           <a:p>
             <a:fld id="{216C5678-EE20-4FA5-88E2-6E0BD67A2E26}" type="datetime1">
               <a:rPr lang="en-US" smtClean="0"/>
-              <a:t>11/16/2015</a:t>
+              <a:t>11/19/2015</a:t>
             </a:fld>
             <a:endParaRPr lang="en-US" dirty="0"/>
           </a:p>
@@ -13510,7 +13510,7 @@
           <a:p>
             <a:fld id="{216C5678-EE20-4FA5-88E2-6E0BD67A2E26}" type="datetime1">
               <a:rPr lang="en-US" smtClean="0"/>
-              <a:t>11/16/2015</a:t>
+              <a:t>11/19/2015</a:t>
             </a:fld>
             <a:endParaRPr lang="en-US" dirty="0"/>
           </a:p>
@@ -13845,7 +13845,7 @@
           <a:p>
             <a:fld id="{216C5678-EE20-4FA5-88E2-6E0BD67A2E26}" type="datetime1">
               <a:rPr lang="en-US" smtClean="0"/>
-              <a:t>11/16/2015</a:t>
+              <a:t>11/19/2015</a:t>
             </a:fld>
             <a:endParaRPr lang="en-US" dirty="0"/>
           </a:p>
@@ -16924,7 +16924,7 @@
           <a:p>
             <a:fld id="{216C5678-EE20-4FA5-88E2-6E0BD67A2E26}" type="datetime1">
               <a:rPr lang="en-US" smtClean="0"/>
-              <a:t>11/16/2015</a:t>
+              <a:t>11/19/2015</a:t>
             </a:fld>
             <a:endParaRPr lang="en-US" dirty="0"/>
           </a:p>
@@ -17261,7 +17261,7 @@
           <a:p>
             <a:fld id="{216C5678-EE20-4FA5-88E2-6E0BD67A2E26}" type="datetime1">
               <a:rPr lang="en-US" smtClean="0"/>
-              <a:t>11/16/2015</a:t>
+              <a:t>11/19/2015</a:t>
             </a:fld>
             <a:endParaRPr lang="en-US" dirty="0"/>
           </a:p>
@@ -17502,7 +17502,7 @@
           <a:p>
             <a:fld id="{216C5678-EE20-4FA5-88E2-6E0BD67A2E26}" type="datetime1">
               <a:rPr lang="en-US" smtClean="0"/>
-              <a:t>11/16/2015</a:t>
+              <a:t>11/19/2015</a:t>
             </a:fld>
             <a:endParaRPr lang="en-US" dirty="0"/>
           </a:p>
@@ -23539,7 +23539,7 @@
           <a:p>
             <a:fld id="{216C5678-EE20-4FA5-88E2-6E0BD67A2E26}" type="datetime1">
               <a:rPr lang="en-US" smtClean="0"/>
-              <a:t>11/16/2015</a:t>
+              <a:t>11/19/2015</a:t>
             </a:fld>
             <a:endParaRPr lang="en-US" dirty="0"/>
           </a:p>
@@ -24435,7 +24435,7 @@
           <a:p>
             <a:fld id="{216C5678-EE20-4FA5-88E2-6E0BD67A2E26}" type="datetime1">
               <a:rPr lang="en-US" smtClean="0"/>
-              <a:t>11/16/2015</a:t>
+              <a:t>11/19/2015</a:t>
             </a:fld>
             <a:endParaRPr lang="en-US" dirty="0"/>
           </a:p>
@@ -24772,7 +24772,7 @@
           <a:p>
             <a:fld id="{216C5678-EE20-4FA5-88E2-6E0BD67A2E26}" type="datetime1">
               <a:rPr lang="en-US" smtClean="0"/>
-              <a:t>11/16/2015</a:t>
+              <a:t>11/19/2015</a:t>
             </a:fld>
             <a:endParaRPr lang="en-US" dirty="0"/>
           </a:p>
@@ -27994,7 +27994,7 @@
           <a:p>
             <a:fld id="{216C5678-EE20-4FA5-88E2-6E0BD67A2E26}" type="datetime1">
               <a:rPr lang="en-US" smtClean="0"/>
-              <a:t>11/16/2015</a:t>
+              <a:t>11/19/2015</a:t>
             </a:fld>
             <a:endParaRPr lang="en-US" dirty="0"/>
           </a:p>
@@ -28274,7 +28274,7 @@
           <a:p>
             <a:fld id="{216C5678-EE20-4FA5-88E2-6E0BD67A2E26}" type="datetime1">
               <a:rPr lang="en-US" smtClean="0"/>
-              <a:t>11/16/2015</a:t>
+              <a:t>11/19/2015</a:t>
             </a:fld>
             <a:endParaRPr lang="en-US" dirty="0"/>
           </a:p>
@@ -28495,7 +28495,7 @@
           <a:p>
             <a:fld id="{216C5678-EE20-4FA5-88E2-6E0BD67A2E26}" type="datetime1">
               <a:rPr lang="en-US" smtClean="0"/>
-              <a:t>11/16/2015</a:t>
+              <a:t>11/19/2015</a:t>
             </a:fld>
             <a:endParaRPr lang="en-US" dirty="0"/>
           </a:p>
@@ -31046,7 +31046,7 @@
             <a:fld id="{216C5678-EE20-4FA5-88E2-6E0BD67A2E26}" type="datetime1">
               <a:rPr lang="en-US" smtClean="0"/>
               <a:pPr/>
-              <a:t>11/16/2015</a:t>
+              <a:t>11/19/2015</a:t>
             </a:fld>
             <a:endParaRPr lang="en-US" dirty="0"/>
           </a:p>
@@ -31237,7 +31237,7 @@
           <a:p>
             <a:fld id="{216C5678-EE20-4FA5-88E2-6E0BD67A2E26}" type="datetime1">
               <a:rPr lang="en-US" smtClean="0"/>
-              <a:t>11/16/2015</a:t>
+              <a:t>11/19/2015</a:t>
             </a:fld>
             <a:endParaRPr lang="en-US" dirty="0"/>
           </a:p>
@@ -31402,7 +31402,7 @@
           <p:nvPr>
             <p:extLst>
               <p:ext uri="{D42A27DB-BD31-4B8C-83A1-F6EECF244321}">
-                <p14:modId xmlns:p14="http://schemas.microsoft.com/office/powerpoint/2010/main" val="144994421"/>
+                <p14:modId xmlns:p14="http://schemas.microsoft.com/office/powerpoint/2010/main" val="3223897347"/>
               </p:ext>
             </p:extLst>
           </p:nvPr>
@@ -31831,8 +31831,16 @@
                           <a:ea typeface="Verdana" panose="020B0604030504040204" pitchFamily="34" charset="0"/>
                           <a:cs typeface="Verdana" panose="020B0604030504040204" pitchFamily="34" charset="0"/>
                         </a:rPr>
-                        <a:t>En revisión</a:t>
+                        <a:t>Revisado</a:t>
                       </a:r>
+                      <a:endParaRPr lang="es-ES" sz="1200" b="1" kern="1200" dirty="0" smtClean="0">
+                        <a:solidFill>
+                          <a:schemeClr val="dk1"/>
+                        </a:solidFill>
+                        <a:latin typeface="+mj-lt"/>
+                        <a:ea typeface="Verdana" panose="020B0604030504040204" pitchFamily="34" charset="0"/>
+                        <a:cs typeface="Verdana" panose="020B0604030504040204" pitchFamily="34" charset="0"/>
+                      </a:endParaRPr>
                     </a:p>
                   </a:txBody>
                   <a:tcPr anchor="ctr" horzOverflow="overflow"/>
@@ -32086,7 +32094,7 @@
                         <a:tabLst/>
                       </a:pPr>
                       <a:r>
-                        <a:rPr lang="es-ES" sz="1200" b="1" kern="1200" dirty="0" smtClean="0">
+                        <a:rPr lang="es-ES" sz="1200" b="1" kern="1200" smtClean="0">
                           <a:solidFill>
                             <a:schemeClr val="dk1"/>
                           </a:solidFill>
@@ -32094,8 +32102,16 @@
                           <a:ea typeface="Verdana" panose="020B0604030504040204" pitchFamily="34" charset="0"/>
                           <a:cs typeface="Verdana" panose="020B0604030504040204" pitchFamily="34" charset="0"/>
                         </a:rPr>
-                        <a:t>En revisión</a:t>
+                        <a:t>Revisado</a:t>
                       </a:r>
+                      <a:endParaRPr lang="es-ES" sz="1200" b="1" kern="1200" dirty="0" smtClean="0">
+                        <a:solidFill>
+                          <a:schemeClr val="dk1"/>
+                        </a:solidFill>
+                        <a:latin typeface="+mj-lt"/>
+                        <a:ea typeface="Verdana" panose="020B0604030504040204" pitchFamily="34" charset="0"/>
+                        <a:cs typeface="Verdana" panose="020B0604030504040204" pitchFamily="34" charset="0"/>
+                      </a:endParaRPr>
                     </a:p>
                   </a:txBody>
                   <a:tcPr anchor="ctr" horzOverflow="overflow"/>
@@ -32183,14 +32199,6 @@
                         </a:rPr>
                         <a:t>3</a:t>
                       </a:r>
-                      <a:endParaRPr lang="es-ES" sz="1200" b="1" kern="1200" dirty="0" smtClean="0">
-                        <a:solidFill>
-                          <a:schemeClr val="dk1"/>
-                        </a:solidFill>
-                        <a:latin typeface="+mj-lt"/>
-                        <a:ea typeface="Verdana" panose="020B0604030504040204" pitchFamily="34" charset="0"/>
-                        <a:cs typeface="Verdana" panose="020B0604030504040204" pitchFamily="34" charset="0"/>
-                      </a:endParaRPr>
                     </a:p>
                   </a:txBody>
                   <a:tcPr marT="45702" marB="45702" anchor="ctr" horzOverflow="overflow"/>
@@ -32399,14 +32407,6 @@
                         </a:rPr>
                         <a:t>4</a:t>
                       </a:r>
-                      <a:endParaRPr lang="es-ES" sz="1200" b="1" kern="1200" dirty="0" smtClean="0">
-                        <a:solidFill>
-                          <a:schemeClr val="dk1"/>
-                        </a:solidFill>
-                        <a:latin typeface="+mj-lt"/>
-                        <a:ea typeface="Verdana" panose="020B0604030504040204" pitchFamily="34" charset="0"/>
-                        <a:cs typeface="Verdana" panose="020B0604030504040204" pitchFamily="34" charset="0"/>
-                      </a:endParaRPr>
                     </a:p>
                   </a:txBody>
                   <a:tcPr marT="45702" marB="45702" anchor="ctr" horzOverflow="overflow"/>
@@ -32615,14 +32615,6 @@
                         </a:rPr>
                         <a:t>5</a:t>
                       </a:r>
-                      <a:endParaRPr lang="es-ES" sz="1200" b="1" kern="1200" dirty="0" smtClean="0">
-                        <a:solidFill>
-                          <a:schemeClr val="dk1"/>
-                        </a:solidFill>
-                        <a:latin typeface="+mj-lt"/>
-                        <a:ea typeface="Verdana" panose="020B0604030504040204" pitchFamily="34" charset="0"/>
-                        <a:cs typeface="Verdana" panose="020B0604030504040204" pitchFamily="34" charset="0"/>
-                      </a:endParaRPr>
                     </a:p>
                   </a:txBody>
                   <a:tcPr marT="45702" marB="45702" anchor="ctr" horzOverflow="overflow"/>
@@ -32985,7 +32977,7 @@
           <a:p>
             <a:fld id="{216C5678-EE20-4FA5-88E2-6E0BD67A2E26}" type="datetime1">
               <a:rPr lang="en-US" smtClean="0"/>
-              <a:t>11/16/2015</a:t>
+              <a:t>11/19/2015</a:t>
             </a:fld>
             <a:endParaRPr lang="en-US" dirty="0"/>
           </a:p>
@@ -33292,7 +33284,7 @@
           <a:p>
             <a:fld id="{216C5678-EE20-4FA5-88E2-6E0BD67A2E26}" type="datetime1">
               <a:rPr lang="en-US" smtClean="0"/>
-              <a:t>11/16/2015</a:t>
+              <a:t>11/19/2015</a:t>
             </a:fld>
             <a:endParaRPr lang="en-US" dirty="0"/>
           </a:p>
@@ -33483,7 +33475,7 @@
           <a:p>
             <a:fld id="{216C5678-EE20-4FA5-88E2-6E0BD67A2E26}" type="datetime1">
               <a:rPr lang="en-US" smtClean="0"/>
-              <a:t>11/16/2015</a:t>
+              <a:t>11/19/2015</a:t>
             </a:fld>
             <a:endParaRPr lang="en-US" dirty="0"/>
           </a:p>
@@ -34444,7 +34436,7 @@
           <a:p>
             <a:fld id="{216C5678-EE20-4FA5-88E2-6E0BD67A2E26}" type="datetime1">
               <a:rPr lang="en-US" smtClean="0"/>
-              <a:t>11/16/2015</a:t>
+              <a:t>11/19/2015</a:t>
             </a:fld>
             <a:endParaRPr lang="en-US" dirty="0"/>
           </a:p>
@@ -34607,7 +34599,7 @@
           <a:p>
             <a:fld id="{216C5678-EE20-4FA5-88E2-6E0BD67A2E26}" type="datetime1">
               <a:rPr lang="en-US" smtClean="0"/>
-              <a:t>11/16/2015</a:t>
+              <a:t>11/19/2015</a:t>
             </a:fld>
             <a:endParaRPr lang="en-US" dirty="0"/>
           </a:p>
@@ -34835,7 +34827,7 @@
           <a:p>
             <a:fld id="{216C5678-EE20-4FA5-88E2-6E0BD67A2E26}" type="datetime1">
               <a:rPr lang="en-US" smtClean="0"/>
-              <a:t>11/16/2015</a:t>
+              <a:t>11/19/2015</a:t>
             </a:fld>
             <a:endParaRPr lang="en-US" dirty="0"/>
           </a:p>

</xml_diff>